<commit_message>
Computed rats cluster and frailty models.
</commit_message>
<xml_diff>
--- a/r/class7.pptx
+++ b/r/class7.pptx
@@ -34,6 +34,16 @@
     <p:sldId id="282" r:id="rId28"/>
     <p:sldId id="283" r:id="rId29"/>
     <p:sldId id="284" r:id="rId30"/>
+    <p:sldId id="285" r:id="rId31"/>
+    <p:sldId id="286" r:id="rId32"/>
+    <p:sldId id="287" r:id="rId33"/>
+    <p:sldId id="288" r:id="rId34"/>
+    <p:sldId id="289" r:id="rId35"/>
+    <p:sldId id="290" r:id="rId36"/>
+    <p:sldId id="291" r:id="rId37"/>
+    <p:sldId id="292" r:id="rId38"/>
+    <p:sldId id="293" r:id="rId39"/>
+    <p:sldId id="294" r:id="rId40"/>
   </p:sldIdLst>
   <p:sldSz cx="9144000" cy="6858000" type="screen4x3"/>
   <p:notesSz cx="6858000" cy="9144000"/>
@@ -3650,8 +3660,8 @@
         </p:blipFill>
         <p:spPr bwMode="auto">
           <a:xfrm>
-            <a:off x="1739900" y="1600200"/>
-            <a:ext cx="5664200" cy="4521200"/>
+            <a:off x="1905000" y="1600200"/>
+            <a:ext cx="5334000" cy="4521200"/>
           </a:xfrm>
           <a:prstGeom prst="rect">
             <a:avLst/>
@@ -3791,8 +3801,8 @@
         </p:blipFill>
         <p:spPr bwMode="auto">
           <a:xfrm>
-            <a:off x="1587500" y="1600200"/>
-            <a:ext cx="5969000" cy="4521200"/>
+            <a:off x="1511300" y="1600200"/>
+            <a:ext cx="6108700" cy="4521200"/>
           </a:xfrm>
           <a:prstGeom prst="rect">
             <a:avLst/>
@@ -4592,8 +4602,8 @@
         </p:blipFill>
         <p:spPr bwMode="auto">
           <a:xfrm>
-            <a:off x="977900" y="1600200"/>
-            <a:ext cx="7188200" cy="4521200"/>
+            <a:off x="1155700" y="1600200"/>
+            <a:ext cx="6832600" cy="4521200"/>
           </a:xfrm>
           <a:prstGeom prst="rect">
             <a:avLst/>
@@ -4733,8 +4743,8 @@
         </p:blipFill>
         <p:spPr bwMode="auto">
           <a:xfrm>
-            <a:off x="1587500" y="1600200"/>
-            <a:ext cx="5969000" cy="4521200"/>
+            <a:off x="1511300" y="1600200"/>
+            <a:ext cx="6108700" cy="4521200"/>
           </a:xfrm>
           <a:prstGeom prst="rect">
             <a:avLst/>
@@ -5195,6 +5205,208 @@
             </a:pPr>
             <a:r>
               <a:rPr/>
+              <a:t>Changes</a:t>
+            </a:r>
+            <a:r>
+              <a:rPr/>
+              <a:t> </a:t>
+            </a:r>
+            <a:r>
+              <a:rPr/>
+              <a:t>in</a:t>
+            </a:r>
+            <a:r>
+              <a:rPr/>
+              <a:t> </a:t>
+            </a:r>
+            <a:r>
+              <a:rPr/>
+              <a:t>number</a:t>
+            </a:r>
+            <a:r>
+              <a:rPr/>
+              <a:t> </a:t>
+            </a:r>
+            <a:r>
+              <a:rPr/>
+              <a:t>at</a:t>
+            </a:r>
+            <a:r>
+              <a:rPr/>
+              <a:t> </a:t>
+            </a:r>
+            <a:r>
+              <a:rPr/>
+              <a:t>risk</a:t>
+            </a:r>
+          </a:p>
+        </p:txBody>
+      </p:sp>
+      <p:pic>
+        <p:nvPicPr>
+          <p:cNvPr descr="class7_files/figure-pptx/n_atrisk-1.png" id="0" name="Picture 1"/>
+          <p:cNvPicPr>
+            <a:picLocks noGrp="1" noChangeAspect="1"/>
+          </p:cNvPicPr>
+          <p:nvPr/>
+        </p:nvPicPr>
+        <p:blipFill>
+          <a:blip r:embed="rId2"/>
+          <a:stretch>
+            <a:fillRect/>
+          </a:stretch>
+        </p:blipFill>
+        <p:spPr bwMode="auto">
+          <a:xfrm>
+            <a:off x="508000" y="1600200"/>
+            <a:ext cx="8140700" cy="4521200"/>
+          </a:xfrm>
+          <a:prstGeom prst="rect">
+            <a:avLst/>
+          </a:prstGeom>
+          <a:noFill/>
+          <a:ln w="9525">
+            <a:noFill/>
+            <a:headEnd/>
+            <a:tailEnd/>
+          </a:ln>
+        </p:spPr>
+      </p:pic>
+    </p:spTree>
+  </p:cSld>
+</p:sld>
+</file>
+
+<file path=ppt/slides/slide23.xml><?xml version="1.0" encoding="utf-8"?>
+<p:sld xmlns:a="http://schemas.openxmlformats.org/drawingml/2006/main" xmlns:r="http://schemas.openxmlformats.org/officeDocument/2006/relationships" xmlns:p="http://schemas.openxmlformats.org/presentationml/2006/main">
+  <p:cSld>
+    <p:spTree>
+      <p:nvGrpSpPr>
+        <p:cNvPr id="1" name=""/>
+        <p:cNvGrpSpPr/>
+        <p:nvPr/>
+      </p:nvGrpSpPr>
+      <p:grpSpPr>
+        <a:xfrm>
+          <a:off x="0" y="0"/>
+          <a:ext cx="0" cy="0"/>
+          <a:chOff x="0" y="0"/>
+          <a:chExt cx="0" cy="0"/>
+        </a:xfrm>
+      </p:grpSpPr>
+      <p:sp>
+        <p:nvSpPr>
+          <p:cNvPr id="2" name="Title 1"/>
+          <p:cNvSpPr>
+            <a:spLocks noGrp="1"/>
+          </p:cNvSpPr>
+          <p:nvPr>
+            <p:ph type="title"/>
+          </p:nvPr>
+        </p:nvSpPr>
+        <p:spPr/>
+        <p:txBody>
+          <a:bodyPr/>
+          <a:lstStyle/>
+          <a:p>
+            <a:pPr lvl="0" marL="0" indent="0">
+              <a:buNone/>
+            </a:pPr>
+            <a:r>
+              <a:rPr/>
+              <a:t>Kaplan-Meier</a:t>
+            </a:r>
+            <a:r>
+              <a:rPr/>
+              <a:t> </a:t>
+            </a:r>
+            <a:r>
+              <a:rPr/>
+              <a:t>survival</a:t>
+            </a:r>
+            <a:r>
+              <a:rPr/>
+              <a:t> </a:t>
+            </a:r>
+            <a:r>
+              <a:rPr/>
+              <a:t>estimates</a:t>
+            </a:r>
+          </a:p>
+        </p:txBody>
+      </p:sp>
+      <p:pic>
+        <p:nvPicPr>
+          <p:cNvPr descr="class7_files/figure-pptx/km-1.png" id="0" name="Picture 1"/>
+          <p:cNvPicPr>
+            <a:picLocks noGrp="1" noChangeAspect="1"/>
+          </p:cNvPicPr>
+          <p:nvPr/>
+        </p:nvPicPr>
+        <p:blipFill>
+          <a:blip r:embed="rId2"/>
+          <a:stretch>
+            <a:fillRect/>
+          </a:stretch>
+        </p:blipFill>
+        <p:spPr bwMode="auto">
+          <a:xfrm>
+            <a:off x="508000" y="1600200"/>
+            <a:ext cx="8140700" cy="4521200"/>
+          </a:xfrm>
+          <a:prstGeom prst="rect">
+            <a:avLst/>
+          </a:prstGeom>
+          <a:noFill/>
+          <a:ln w="9525">
+            <a:noFill/>
+            <a:headEnd/>
+            <a:tailEnd/>
+          </a:ln>
+        </p:spPr>
+      </p:pic>
+    </p:spTree>
+  </p:cSld>
+</p:sld>
+</file>
+
+<file path=ppt/slides/slide24.xml><?xml version="1.0" encoding="utf-8"?>
+<p:sld xmlns:a="http://schemas.openxmlformats.org/drawingml/2006/main" xmlns:r="http://schemas.openxmlformats.org/officeDocument/2006/relationships" xmlns:p="http://schemas.openxmlformats.org/presentationml/2006/main">
+  <p:cSld>
+    <p:spTree>
+      <p:nvGrpSpPr>
+        <p:cNvPr id="1" name=""/>
+        <p:cNvGrpSpPr/>
+        <p:nvPr/>
+      </p:nvGrpSpPr>
+      <p:grpSpPr>
+        <a:xfrm>
+          <a:off x="0" y="0"/>
+          <a:ext cx="0" cy="0"/>
+          <a:chOff x="0" y="0"/>
+          <a:chExt cx="0" cy="0"/>
+        </a:xfrm>
+      </p:grpSpPr>
+      <p:sp>
+        <p:nvSpPr>
+          <p:cNvPr id="2" name="Title 1"/>
+          <p:cNvSpPr>
+            <a:spLocks noGrp="1"/>
+          </p:cNvSpPr>
+          <p:nvPr>
+            <p:ph type="title"/>
+          </p:nvPr>
+        </p:nvSpPr>
+        <p:spPr/>
+        <p:txBody>
+          <a:bodyPr/>
+          <a:lstStyle/>
+          <a:p>
+            <a:pPr lvl="0" marL="0" indent="0">
+              <a:buNone/>
+            </a:pPr>
+            <a:r>
+              <a:rPr/>
               <a:t>Sandwich</a:t>
             </a:r>
             <a:r>
@@ -5406,7 +5618,7 @@
 </p:sld>
 </file>
 
-<file path=ppt/slides/slide23.xml><?xml version="1.0" encoding="utf-8"?>
+<file path=ppt/slides/slide25.xml><?xml version="1.0" encoding="utf-8"?>
 <p:sld xmlns:a="http://schemas.openxmlformats.org/drawingml/2006/main" xmlns:r="http://schemas.openxmlformats.org/officeDocument/2006/relationships" xmlns:p="http://schemas.openxmlformats.org/presentationml/2006/main">
   <p:cSld>
     <p:spTree>
@@ -5627,7 +5839,7 @@
 </p:sld>
 </file>
 
-<file path=ppt/slides/slide24.xml><?xml version="1.0" encoding="utf-8"?>
+<file path=ppt/slides/slide26.xml><?xml version="1.0" encoding="utf-8"?>
 <p:sld xmlns:a="http://schemas.openxmlformats.org/drawingml/2006/main" xmlns:r="http://schemas.openxmlformats.org/officeDocument/2006/relationships" xmlns:p="http://schemas.openxmlformats.org/presentationml/2006/main">
   <p:cSld>
     <p:spTree>
@@ -5948,192 +6160,6 @@
 </p:sld>
 </file>
 
-<file path=ppt/slides/slide25.xml><?xml version="1.0" encoding="utf-8"?>
-<p:sld xmlns:a="http://schemas.openxmlformats.org/drawingml/2006/main" xmlns:r="http://schemas.openxmlformats.org/officeDocument/2006/relationships" xmlns:p="http://schemas.openxmlformats.org/presentationml/2006/main">
-  <p:cSld>
-    <p:spTree>
-      <p:nvGrpSpPr>
-        <p:cNvPr id="1" name=""/>
-        <p:cNvGrpSpPr/>
-        <p:nvPr/>
-      </p:nvGrpSpPr>
-      <p:grpSpPr>
-        <a:xfrm>
-          <a:off x="0" y="0"/>
-          <a:ext cx="0" cy="0"/>
-          <a:chOff x="0" y="0"/>
-          <a:chExt cx="0" cy="0"/>
-        </a:xfrm>
-      </p:grpSpPr>
-      <p:sp>
-        <p:nvSpPr>
-          <p:cNvPr id="2" name="Title 1"/>
-          <p:cNvSpPr>
-            <a:spLocks noGrp="1"/>
-          </p:cNvSpPr>
-          <p:nvPr>
-            <p:ph type="title"/>
-          </p:nvPr>
-        </p:nvSpPr>
-        <p:spPr/>
-        <p:txBody>
-          <a:bodyPr/>
-          <a:lstStyle/>
-          <a:p>
-            <a:pPr lvl="0" marL="0" indent="0">
-              <a:buNone/>
-            </a:pPr>
-            <a:r>
-              <a:rPr/>
-              <a:t>Gamma</a:t>
-            </a:r>
-            <a:r>
-              <a:rPr/>
-              <a:t> </a:t>
-            </a:r>
-            <a:r>
-              <a:rPr/>
-              <a:t>distribution,</a:t>
-            </a:r>
-            <a:r>
-              <a:rPr/>
-              <a:t> </a:t>
-            </a:r>
-            <a:r>
-              <a:rPr/>
-              <a:t>alpha=50</a:t>
-            </a:r>
-          </a:p>
-        </p:txBody>
-      </p:sp>
-      <p:pic>
-        <p:nvPicPr>
-          <p:cNvPr descr="class7_files/figure-pptx/graph-gamma-50-1.png" id="0" name="Picture 1"/>
-          <p:cNvPicPr>
-            <a:picLocks noGrp="1" noChangeAspect="1"/>
-          </p:cNvPicPr>
-          <p:nvPr/>
-        </p:nvPicPr>
-        <p:blipFill>
-          <a:blip r:embed="rId2"/>
-          <a:stretch>
-            <a:fillRect/>
-          </a:stretch>
-        </p:blipFill>
-        <p:spPr bwMode="auto">
-          <a:xfrm>
-            <a:off x="508000" y="1600200"/>
-            <a:ext cx="8140700" cy="4521200"/>
-          </a:xfrm>
-          <a:prstGeom prst="rect">
-            <a:avLst/>
-          </a:prstGeom>
-          <a:noFill/>
-          <a:ln w="9525">
-            <a:noFill/>
-            <a:headEnd/>
-            <a:tailEnd/>
-          </a:ln>
-        </p:spPr>
-      </p:pic>
-    </p:spTree>
-  </p:cSld>
-</p:sld>
-</file>
-
-<file path=ppt/slides/slide26.xml><?xml version="1.0" encoding="utf-8"?>
-<p:sld xmlns:a="http://schemas.openxmlformats.org/drawingml/2006/main" xmlns:r="http://schemas.openxmlformats.org/officeDocument/2006/relationships" xmlns:p="http://schemas.openxmlformats.org/presentationml/2006/main">
-  <p:cSld>
-    <p:spTree>
-      <p:nvGrpSpPr>
-        <p:cNvPr id="1" name=""/>
-        <p:cNvGrpSpPr/>
-        <p:nvPr/>
-      </p:nvGrpSpPr>
-      <p:grpSpPr>
-        <a:xfrm>
-          <a:off x="0" y="0"/>
-          <a:ext cx="0" cy="0"/>
-          <a:chOff x="0" y="0"/>
-          <a:chExt cx="0" cy="0"/>
-        </a:xfrm>
-      </p:grpSpPr>
-      <p:sp>
-        <p:nvSpPr>
-          <p:cNvPr id="2" name="Title 1"/>
-          <p:cNvSpPr>
-            <a:spLocks noGrp="1"/>
-          </p:cNvSpPr>
-          <p:nvPr>
-            <p:ph type="title"/>
-          </p:nvPr>
-        </p:nvSpPr>
-        <p:spPr/>
-        <p:txBody>
-          <a:bodyPr/>
-          <a:lstStyle/>
-          <a:p>
-            <a:pPr lvl="0" marL="0" indent="0">
-              <a:buNone/>
-            </a:pPr>
-            <a:r>
-              <a:rPr/>
-              <a:t>Gamma</a:t>
-            </a:r>
-            <a:r>
-              <a:rPr/>
-              <a:t> </a:t>
-            </a:r>
-            <a:r>
-              <a:rPr/>
-              <a:t>distribution,</a:t>
-            </a:r>
-            <a:r>
-              <a:rPr/>
-              <a:t> </a:t>
-            </a:r>
-            <a:r>
-              <a:rPr/>
-              <a:t>alpha=10</a:t>
-            </a:r>
-          </a:p>
-        </p:txBody>
-      </p:sp>
-      <p:pic>
-        <p:nvPicPr>
-          <p:cNvPr descr="class7_files/figure-pptx/graph-gamma-1.png" id="0" name="Picture 1"/>
-          <p:cNvPicPr>
-            <a:picLocks noGrp="1" noChangeAspect="1"/>
-          </p:cNvPicPr>
-          <p:nvPr/>
-        </p:nvPicPr>
-        <p:blipFill>
-          <a:blip r:embed="rId2"/>
-          <a:stretch>
-            <a:fillRect/>
-          </a:stretch>
-        </p:blipFill>
-        <p:spPr bwMode="auto">
-          <a:xfrm>
-            <a:off x="508000" y="1600200"/>
-            <a:ext cx="8140700" cy="4521200"/>
-          </a:xfrm>
-          <a:prstGeom prst="rect">
-            <a:avLst/>
-          </a:prstGeom>
-          <a:noFill/>
-          <a:ln w="9525">
-            <a:noFill/>
-            <a:headEnd/>
-            <a:tailEnd/>
-          </a:ln>
-        </p:spPr>
-      </p:pic>
-    </p:spTree>
-  </p:cSld>
-</p:sld>
-</file>
-
 <file path=ppt/slides/slide27.xml><?xml version="1.0" encoding="utf-8"?>
 <p:sld xmlns:a="http://schemas.openxmlformats.org/drawingml/2006/main" xmlns:r="http://schemas.openxmlformats.org/officeDocument/2006/relationships" xmlns:p="http://schemas.openxmlformats.org/presentationml/2006/main">
   <p:cSld>
@@ -6179,22 +6205,22 @@
             </a:r>
             <a:r>
               <a:rPr/>
-              <a:t>distribution:</a:t>
-            </a:r>
-            <a:r>
-              <a:rPr/>
-              <a:t> </a:t>
-            </a:r>
-            <a:r>
-              <a:rPr/>
-              <a:t>alpha=5</a:t>
+              <a:t>distribution,</a:t>
+            </a:r>
+            <a:r>
+              <a:rPr/>
+              <a:t> </a:t>
+            </a:r>
+            <a:r>
+              <a:rPr/>
+              <a:t>alpha=50</a:t>
             </a:r>
           </a:p>
         </p:txBody>
       </p:sp>
       <p:pic>
         <p:nvPicPr>
-          <p:cNvPr descr="class7_files/figure-pptx/gamma-5-1.png" id="0" name="Picture 1"/>
+          <p:cNvPr descr="class7_files/figure-pptx/graph-gamma-50-1.png" id="0" name="Picture 1"/>
           <p:cNvPicPr>
             <a:picLocks noGrp="1" noChangeAspect="1"/>
           </p:cNvPicPr>
@@ -6272,22 +6298,22 @@
             </a:r>
             <a:r>
               <a:rPr/>
-              <a:t>distribution:</a:t>
-            </a:r>
-            <a:r>
-              <a:rPr/>
-              <a:t> </a:t>
-            </a:r>
-            <a:r>
-              <a:rPr/>
-              <a:t>alpha=2</a:t>
+              <a:t>distribution,</a:t>
+            </a:r>
+            <a:r>
+              <a:rPr/>
+              <a:t> </a:t>
+            </a:r>
+            <a:r>
+              <a:rPr/>
+              <a:t>alpha=10</a:t>
             </a:r>
           </a:p>
         </p:txBody>
       </p:sp>
       <p:pic>
         <p:nvPicPr>
-          <p:cNvPr descr="class7_files/figure-pptx/gamma-2-1.png" id="0" name="Picture 1"/>
+          <p:cNvPr descr="class7_files/figure-pptx/graph-gamma-1.png" id="0" name="Picture 1"/>
           <p:cNvPicPr>
             <a:picLocks noGrp="1" noChangeAspect="1"/>
           </p:cNvPicPr>
@@ -6357,44 +6383,57 @@
             </a:pPr>
             <a:r>
               <a:rPr/>
-              <a:t>Three</a:t>
-            </a:r>
-            <a:r>
-              <a:rPr/>
-              <a:t> </a:t>
-            </a:r>
-            <a:r>
-              <a:rPr/>
-              <a:t>models</a:t>
-            </a:r>
-          </a:p>
-        </p:txBody>
-      </p:sp>
-      <p:sp>
-        <p:nvSpPr>
-          <p:cNvPr id="3" name="Content Placeholder 2"/>
-          <p:cNvSpPr>
-            <a:spLocks noGrp="1"/>
-          </p:cNvSpPr>
-          <p:nvPr>
-            <p:ph idx="1"/>
-          </p:nvPr>
-        </p:nvSpPr>
-        <p:spPr/>
-        <p:txBody>
-          <a:bodyPr/>
-          <a:lstStyle/>
-          <a:p>
-            <a:pPr lvl="0" marL="0" indent="0">
-              <a:buNone/>
-            </a:pPr>
-            <a:r>
-              <a:rPr/>
-              <a:t>Save everything for possible later re-use.</a:t>
-            </a:r>
-          </a:p>
-        </p:txBody>
-      </p:sp>
+              <a:t>Gamma</a:t>
+            </a:r>
+            <a:r>
+              <a:rPr/>
+              <a:t> </a:t>
+            </a:r>
+            <a:r>
+              <a:rPr/>
+              <a:t>distribution:</a:t>
+            </a:r>
+            <a:r>
+              <a:rPr/>
+              <a:t> </a:t>
+            </a:r>
+            <a:r>
+              <a:rPr/>
+              <a:t>alpha=5</a:t>
+            </a:r>
+          </a:p>
+        </p:txBody>
+      </p:sp>
+      <p:pic>
+        <p:nvPicPr>
+          <p:cNvPr descr="class7_files/figure-pptx/gamma-5-1.png" id="0" name="Picture 1"/>
+          <p:cNvPicPr>
+            <a:picLocks noGrp="1" noChangeAspect="1"/>
+          </p:cNvPicPr>
+          <p:nvPr/>
+        </p:nvPicPr>
+        <p:blipFill>
+          <a:blip r:embed="rId2"/>
+          <a:stretch>
+            <a:fillRect/>
+          </a:stretch>
+        </p:blipFill>
+        <p:spPr bwMode="auto">
+          <a:xfrm>
+            <a:off x="508000" y="1600200"/>
+            <a:ext cx="8140700" cy="4521200"/>
+          </a:xfrm>
+          <a:prstGeom prst="rect">
+            <a:avLst/>
+          </a:prstGeom>
+          <a:noFill/>
+          <a:ln w="9525">
+            <a:noFill/>
+            <a:headEnd/>
+            <a:tailEnd/>
+          </a:ln>
+        </p:spPr>
+      </p:pic>
     </p:spTree>
   </p:cSld>
 </p:sld>
@@ -6471,6 +6510,1106 @@
             <a:r>
               <a:rPr/>
               <a:t>You can incorporate mutliple events per patient and account for center effects using frailty models, the survival data analysis equivalent to mixed models in linear regression. You’ll see how to define random effects and how to fit and interpret these models.</a:t>
+            </a:r>
+          </a:p>
+        </p:txBody>
+      </p:sp>
+    </p:spTree>
+  </p:cSld>
+</p:sld>
+</file>
+
+<file path=ppt/slides/slide30.xml><?xml version="1.0" encoding="utf-8"?>
+<p:sld xmlns:a="http://schemas.openxmlformats.org/drawingml/2006/main" xmlns:r="http://schemas.openxmlformats.org/officeDocument/2006/relationships" xmlns:p="http://schemas.openxmlformats.org/presentationml/2006/main">
+  <p:cSld>
+    <p:spTree>
+      <p:nvGrpSpPr>
+        <p:cNvPr id="1" name=""/>
+        <p:cNvGrpSpPr/>
+        <p:nvPr/>
+      </p:nvGrpSpPr>
+      <p:grpSpPr>
+        <a:xfrm>
+          <a:off x="0" y="0"/>
+          <a:ext cx="0" cy="0"/>
+          <a:chOff x="0" y="0"/>
+          <a:chExt cx="0" cy="0"/>
+        </a:xfrm>
+      </p:grpSpPr>
+      <p:sp>
+        <p:nvSpPr>
+          <p:cNvPr id="2" name="Title 1"/>
+          <p:cNvSpPr>
+            <a:spLocks noGrp="1"/>
+          </p:cNvSpPr>
+          <p:nvPr>
+            <p:ph type="title"/>
+          </p:nvPr>
+        </p:nvSpPr>
+        <p:spPr/>
+        <p:txBody>
+          <a:bodyPr/>
+          <a:lstStyle/>
+          <a:p>
+            <a:pPr lvl="0" marL="0" indent="0">
+              <a:buNone/>
+            </a:pPr>
+            <a:r>
+              <a:rPr/>
+              <a:t>Gamma</a:t>
+            </a:r>
+            <a:r>
+              <a:rPr/>
+              <a:t> </a:t>
+            </a:r>
+            <a:r>
+              <a:rPr/>
+              <a:t>distribution:</a:t>
+            </a:r>
+            <a:r>
+              <a:rPr/>
+              <a:t> </a:t>
+            </a:r>
+            <a:r>
+              <a:rPr/>
+              <a:t>alpha=2</a:t>
+            </a:r>
+          </a:p>
+        </p:txBody>
+      </p:sp>
+      <p:pic>
+        <p:nvPicPr>
+          <p:cNvPr descr="class7_files/figure-pptx/gamma-2-1.png" id="0" name="Picture 1"/>
+          <p:cNvPicPr>
+            <a:picLocks noGrp="1" noChangeAspect="1"/>
+          </p:cNvPicPr>
+          <p:nvPr/>
+        </p:nvPicPr>
+        <p:blipFill>
+          <a:blip r:embed="rId2"/>
+          <a:stretch>
+            <a:fillRect/>
+          </a:stretch>
+        </p:blipFill>
+        <p:spPr bwMode="auto">
+          <a:xfrm>
+            <a:off x="508000" y="1600200"/>
+            <a:ext cx="8140700" cy="4521200"/>
+          </a:xfrm>
+          <a:prstGeom prst="rect">
+            <a:avLst/>
+          </a:prstGeom>
+          <a:noFill/>
+          <a:ln w="9525">
+            <a:noFill/>
+            <a:headEnd/>
+            <a:tailEnd/>
+          </a:ln>
+        </p:spPr>
+      </p:pic>
+    </p:spTree>
+  </p:cSld>
+</p:sld>
+</file>
+
+<file path=ppt/slides/slide31.xml><?xml version="1.0" encoding="utf-8"?>
+<p:sld xmlns:a="http://schemas.openxmlformats.org/drawingml/2006/main" xmlns:r="http://schemas.openxmlformats.org/officeDocument/2006/relationships" xmlns:p="http://schemas.openxmlformats.org/presentationml/2006/main">
+  <p:cSld>
+    <p:spTree>
+      <p:nvGrpSpPr>
+        <p:cNvPr id="1" name=""/>
+        <p:cNvGrpSpPr/>
+        <p:nvPr/>
+      </p:nvGrpSpPr>
+      <p:grpSpPr>
+        <a:xfrm>
+          <a:off x="0" y="0"/>
+          <a:ext cx="0" cy="0"/>
+          <a:chOff x="0" y="0"/>
+          <a:chExt cx="0" cy="0"/>
+        </a:xfrm>
+      </p:grpSpPr>
+      <p:sp>
+        <p:nvSpPr>
+          <p:cNvPr id="2" name="Title 1"/>
+          <p:cNvSpPr>
+            <a:spLocks noGrp="1"/>
+          </p:cNvSpPr>
+          <p:nvPr>
+            <p:ph type="title"/>
+          </p:nvPr>
+        </p:nvSpPr>
+        <p:spPr/>
+        <p:txBody>
+          <a:bodyPr/>
+          <a:lstStyle/>
+          <a:p>
+            <a:pPr lvl="0" marL="0" indent="0">
+              <a:buNone/>
+            </a:pPr>
+            <a:r>
+              <a:rPr/>
+              <a:t>Partial</a:t>
+            </a:r>
+            <a:r>
+              <a:rPr/>
+              <a:t> </a:t>
+            </a:r>
+            <a:r>
+              <a:rPr/>
+              <a:t>listing</a:t>
+            </a:r>
+            <a:r>
+              <a:rPr/>
+              <a:t> </a:t>
+            </a:r>
+            <a:r>
+              <a:rPr/>
+              <a:t>of</a:t>
+            </a:r>
+            <a:r>
+              <a:rPr/>
+              <a:t> </a:t>
+            </a:r>
+            <a:r>
+              <a:rPr/>
+              <a:t>rats</a:t>
+            </a:r>
+            <a:r>
+              <a:rPr/>
+              <a:t> </a:t>
+            </a:r>
+            <a:r>
+              <a:rPr/>
+              <a:t>data</a:t>
+            </a:r>
+          </a:p>
+        </p:txBody>
+      </p:sp>
+      <p:sp>
+        <p:nvSpPr>
+          <p:cNvPr id="3" name="Content Placeholder 2"/>
+          <p:cNvSpPr>
+            <a:spLocks noGrp="1"/>
+          </p:cNvSpPr>
+          <p:nvPr>
+            <p:ph idx="1"/>
+          </p:nvPr>
+        </p:nvSpPr>
+        <p:spPr/>
+        <p:txBody>
+          <a:bodyPr/>
+          <a:lstStyle/>
+          <a:p>
+            <a:pPr lvl="0" marL="1270000" indent="0">
+              <a:buNone/>
+            </a:pPr>
+            <a:r>
+              <a:rPr sz="1800">
+                <a:latin typeface="Courier"/>
+              </a:rPr>
+              <a:t>##   litter rx time status sex
+## 1      1  1  101      0   f
+## 2      1  0   49      1   f
+## 3      1  0  104      0   f
+## 4      2  1   91      0   m
+## 5      2  0  104      0   m
+## 6      2  0  102      0   m</a:t>
+            </a:r>
+          </a:p>
+        </p:txBody>
+      </p:sp>
+    </p:spTree>
+  </p:cSld>
+</p:sld>
+</file>
+
+<file path=ppt/slides/slide32.xml><?xml version="1.0" encoding="utf-8"?>
+<p:sld xmlns:a="http://schemas.openxmlformats.org/drawingml/2006/main" xmlns:r="http://schemas.openxmlformats.org/officeDocument/2006/relationships" xmlns:p="http://schemas.openxmlformats.org/presentationml/2006/main">
+  <p:cSld>
+    <p:spTree>
+      <p:nvGrpSpPr>
+        <p:cNvPr id="1" name=""/>
+        <p:cNvGrpSpPr/>
+        <p:nvPr/>
+      </p:nvGrpSpPr>
+      <p:grpSpPr>
+        <a:xfrm>
+          <a:off x="0" y="0"/>
+          <a:ext cx="0" cy="0"/>
+          <a:chOff x="0" y="0"/>
+          <a:chExt cx="0" cy="0"/>
+        </a:xfrm>
+      </p:grpSpPr>
+      <p:sp>
+        <p:nvSpPr>
+          <p:cNvPr id="2" name="Title 1"/>
+          <p:cNvSpPr>
+            <a:spLocks noGrp="1"/>
+          </p:cNvSpPr>
+          <p:nvPr>
+            <p:ph type="title"/>
+          </p:nvPr>
+        </p:nvSpPr>
+        <p:spPr/>
+        <p:txBody>
+          <a:bodyPr/>
+          <a:lstStyle/>
+          <a:p>
+            <a:pPr lvl="0" marL="0" indent="0">
+              <a:buNone/>
+            </a:pPr>
+            <a:r>
+              <a:rPr/>
+              <a:t>Descriptive</a:t>
+            </a:r>
+            <a:r>
+              <a:rPr/>
+              <a:t> </a:t>
+            </a:r>
+            <a:r>
+              <a:rPr/>
+              <a:t>statistics</a:t>
+            </a:r>
+            <a:r>
+              <a:rPr/>
+              <a:t> </a:t>
+            </a:r>
+            <a:r>
+              <a:rPr/>
+              <a:t>for</a:t>
+            </a:r>
+            <a:r>
+              <a:rPr/>
+              <a:t> </a:t>
+            </a:r>
+            <a:r>
+              <a:rPr/>
+              <a:t>rats</a:t>
+            </a:r>
+            <a:r>
+              <a:rPr/>
+              <a:t> </a:t>
+            </a:r>
+            <a:r>
+              <a:rPr/>
+              <a:t>data</a:t>
+            </a:r>
+          </a:p>
+        </p:txBody>
+      </p:sp>
+      <p:sp>
+        <p:nvSpPr>
+          <p:cNvPr id="3" name="Content Placeholder 2"/>
+          <p:cNvSpPr>
+            <a:spLocks noGrp="1"/>
+          </p:cNvSpPr>
+          <p:nvPr>
+            <p:ph idx="1"/>
+          </p:nvPr>
+        </p:nvSpPr>
+        <p:spPr/>
+        <p:txBody>
+          <a:bodyPr/>
+          <a:lstStyle/>
+          <a:p>
+            <a:pPr lvl="0" marL="1270000" indent="0">
+              <a:buNone/>
+            </a:pPr>
+            <a:r>
+              <a:rPr sz="1800">
+                <a:latin typeface="Courier"/>
+              </a:rPr>
+              <a:t>## 
+##   0   1 
+## 200 100</a:t>
+            </a:r>
+          </a:p>
+          <a:p>
+            <a:pPr lvl="0" marL="1270000" indent="0">
+              <a:buNone/>
+            </a:pPr>
+            <a:r>
+              <a:rPr sz="1800">
+                <a:latin typeface="Courier"/>
+              </a:rPr>
+              <a:t>## 
+##   0   1 
+## 258  42</a:t>
+            </a:r>
+          </a:p>
+          <a:p>
+            <a:pPr lvl="0" marL="1270000" indent="0">
+              <a:buNone/>
+            </a:pPr>
+            <a:r>
+              <a:rPr sz="1800">
+                <a:latin typeface="Courier"/>
+              </a:rPr>
+              <a:t>## 
+##   f   m 
+## 150 150</a:t>
+            </a:r>
+          </a:p>
+          <a:p>
+            <a:pPr lvl="0" marL="1270000" indent="0">
+              <a:buNone/>
+            </a:pPr>
+            <a:r>
+              <a:rPr sz="1800">
+                <a:latin typeface="Courier"/>
+              </a:rPr>
+              <a:t>##    Min. 1st Qu.  Median    Mean 3rd Qu.    Max. 
+##   23.00   80.75   98.00   90.44  104.00  104.00</a:t>
+            </a:r>
+          </a:p>
+        </p:txBody>
+      </p:sp>
+    </p:spTree>
+  </p:cSld>
+</p:sld>
+</file>
+
+<file path=ppt/slides/slide33.xml><?xml version="1.0" encoding="utf-8"?>
+<p:sld xmlns:a="http://schemas.openxmlformats.org/drawingml/2006/main" xmlns:r="http://schemas.openxmlformats.org/officeDocument/2006/relationships" xmlns:p="http://schemas.openxmlformats.org/presentationml/2006/main">
+  <p:cSld>
+    <p:spTree>
+      <p:nvGrpSpPr>
+        <p:cNvPr id="1" name=""/>
+        <p:cNvGrpSpPr/>
+        <p:nvPr/>
+      </p:nvGrpSpPr>
+      <p:grpSpPr>
+        <a:xfrm>
+          <a:off x="0" y="0"/>
+          <a:ext cx="0" cy="0"/>
+          <a:chOff x="0" y="0"/>
+          <a:chExt cx="0" cy="0"/>
+        </a:xfrm>
+      </p:grpSpPr>
+      <p:sp>
+        <p:nvSpPr>
+          <p:cNvPr id="2" name="Title 1"/>
+          <p:cNvSpPr>
+            <a:spLocks noGrp="1"/>
+          </p:cNvSpPr>
+          <p:nvPr>
+            <p:ph type="title"/>
+          </p:nvPr>
+        </p:nvSpPr>
+        <p:spPr/>
+        <p:txBody>
+          <a:bodyPr/>
+          <a:lstStyle/>
+          <a:p>
+            <a:pPr lvl="0" marL="0" indent="0">
+              <a:buNone/>
+            </a:pPr>
+            <a:r>
+              <a:rPr/>
+              <a:t>Overall</a:t>
+            </a:r>
+            <a:r>
+              <a:rPr/>
+              <a:t> </a:t>
+            </a:r>
+            <a:r>
+              <a:rPr/>
+              <a:t>survival</a:t>
+            </a:r>
+          </a:p>
+        </p:txBody>
+      </p:sp>
+      <p:pic>
+        <p:nvPicPr>
+          <p:cNvPr descr="class7_files/figure-pptx/rats-overall-1.png" id="0" name="Picture 1"/>
+          <p:cNvPicPr>
+            <a:picLocks noGrp="1" noChangeAspect="1"/>
+          </p:cNvPicPr>
+          <p:nvPr/>
+        </p:nvPicPr>
+        <p:blipFill>
+          <a:blip r:embed="rId2"/>
+          <a:stretch>
+            <a:fillRect/>
+          </a:stretch>
+        </p:blipFill>
+        <p:spPr bwMode="auto">
+          <a:xfrm>
+            <a:off x="508000" y="1600200"/>
+            <a:ext cx="8140700" cy="4521200"/>
+          </a:xfrm>
+          <a:prstGeom prst="rect">
+            <a:avLst/>
+          </a:prstGeom>
+          <a:noFill/>
+          <a:ln w="9525">
+            <a:noFill/>
+            <a:headEnd/>
+            <a:tailEnd/>
+          </a:ln>
+        </p:spPr>
+      </p:pic>
+    </p:spTree>
+  </p:cSld>
+</p:sld>
+</file>
+
+<file path=ppt/slides/slide34.xml><?xml version="1.0" encoding="utf-8"?>
+<p:sld xmlns:a="http://schemas.openxmlformats.org/drawingml/2006/main" xmlns:r="http://schemas.openxmlformats.org/officeDocument/2006/relationships" xmlns:p="http://schemas.openxmlformats.org/presentationml/2006/main">
+  <p:cSld>
+    <p:spTree>
+      <p:nvGrpSpPr>
+        <p:cNvPr id="1" name=""/>
+        <p:cNvGrpSpPr/>
+        <p:nvPr/>
+      </p:nvGrpSpPr>
+      <p:grpSpPr>
+        <a:xfrm>
+          <a:off x="0" y="0"/>
+          <a:ext cx="0" cy="0"/>
+          <a:chOff x="0" y="0"/>
+          <a:chExt cx="0" cy="0"/>
+        </a:xfrm>
+      </p:grpSpPr>
+      <p:sp>
+        <p:nvSpPr>
+          <p:cNvPr id="2" name="Title 1"/>
+          <p:cNvSpPr>
+            <a:spLocks noGrp="1"/>
+          </p:cNvSpPr>
+          <p:nvPr>
+            <p:ph type="title"/>
+          </p:nvPr>
+        </p:nvSpPr>
+        <p:spPr/>
+        <p:txBody>
+          <a:bodyPr/>
+          <a:lstStyle/>
+          <a:p>
+            <a:pPr lvl="0" marL="0" indent="0">
+              <a:buNone/>
+            </a:pPr>
+            <a:r>
+              <a:rPr/>
+              <a:t>Survival</a:t>
+            </a:r>
+            <a:r>
+              <a:rPr/>
+              <a:t> </a:t>
+            </a:r>
+            <a:r>
+              <a:rPr/>
+              <a:t>by</a:t>
+            </a:r>
+            <a:r>
+              <a:rPr/>
+              <a:t> </a:t>
+            </a:r>
+            <a:r>
+              <a:rPr/>
+              <a:t>treatment</a:t>
+            </a:r>
+          </a:p>
+        </p:txBody>
+      </p:sp>
+      <p:pic>
+        <p:nvPicPr>
+          <p:cNvPr descr="class7_files/figure-pptx/unadjusted-rx-1.png" id="0" name="Picture 1"/>
+          <p:cNvPicPr>
+            <a:picLocks noGrp="1" noChangeAspect="1"/>
+          </p:cNvPicPr>
+          <p:nvPr/>
+        </p:nvPicPr>
+        <p:blipFill>
+          <a:blip r:embed="rId2"/>
+          <a:stretch>
+            <a:fillRect/>
+          </a:stretch>
+        </p:blipFill>
+        <p:spPr bwMode="auto">
+          <a:xfrm>
+            <a:off x="508000" y="1600200"/>
+            <a:ext cx="8140700" cy="4521200"/>
+          </a:xfrm>
+          <a:prstGeom prst="rect">
+            <a:avLst/>
+          </a:prstGeom>
+          <a:noFill/>
+          <a:ln w="9525">
+            <a:noFill/>
+            <a:headEnd/>
+            <a:tailEnd/>
+          </a:ln>
+        </p:spPr>
+      </p:pic>
+    </p:spTree>
+  </p:cSld>
+</p:sld>
+</file>
+
+<file path=ppt/slides/slide35.xml><?xml version="1.0" encoding="utf-8"?>
+<p:sld xmlns:a="http://schemas.openxmlformats.org/drawingml/2006/main" xmlns:r="http://schemas.openxmlformats.org/officeDocument/2006/relationships" xmlns:p="http://schemas.openxmlformats.org/presentationml/2006/main">
+  <p:cSld>
+    <p:spTree>
+      <p:nvGrpSpPr>
+        <p:cNvPr id="1" name=""/>
+        <p:cNvGrpSpPr/>
+        <p:nvPr/>
+      </p:nvGrpSpPr>
+      <p:grpSpPr>
+        <a:xfrm>
+          <a:off x="0" y="0"/>
+          <a:ext cx="0" cy="0"/>
+          <a:chOff x="0" y="0"/>
+          <a:chExt cx="0" cy="0"/>
+        </a:xfrm>
+      </p:grpSpPr>
+      <p:sp>
+        <p:nvSpPr>
+          <p:cNvPr id="2" name="Title 1"/>
+          <p:cNvSpPr>
+            <a:spLocks noGrp="1"/>
+          </p:cNvSpPr>
+          <p:nvPr>
+            <p:ph type="title"/>
+          </p:nvPr>
+        </p:nvSpPr>
+        <p:spPr/>
+        <p:txBody>
+          <a:bodyPr/>
+          <a:lstStyle/>
+          <a:p>
+            <a:pPr lvl="0" marL="0" indent="0">
+              <a:buNone/>
+            </a:pPr>
+            <a:r>
+              <a:rPr/>
+              <a:t>Survival</a:t>
+            </a:r>
+            <a:r>
+              <a:rPr/>
+              <a:t> </a:t>
+            </a:r>
+            <a:r>
+              <a:rPr/>
+              <a:t>by</a:t>
+            </a:r>
+            <a:r>
+              <a:rPr/>
+              <a:t> </a:t>
+            </a:r>
+            <a:r>
+              <a:rPr/>
+              <a:t>sex</a:t>
+            </a:r>
+          </a:p>
+        </p:txBody>
+      </p:sp>
+      <p:pic>
+        <p:nvPicPr>
+          <p:cNvPr descr="class7_files/figure-pptx/unadjusted-sex-1.png" id="0" name="Picture 1"/>
+          <p:cNvPicPr>
+            <a:picLocks noGrp="1" noChangeAspect="1"/>
+          </p:cNvPicPr>
+          <p:nvPr/>
+        </p:nvPicPr>
+        <p:blipFill>
+          <a:blip r:embed="rId2"/>
+          <a:stretch>
+            <a:fillRect/>
+          </a:stretch>
+        </p:blipFill>
+        <p:spPr bwMode="auto">
+          <a:xfrm>
+            <a:off x="508000" y="1600200"/>
+            <a:ext cx="8140700" cy="4521200"/>
+          </a:xfrm>
+          <a:prstGeom prst="rect">
+            <a:avLst/>
+          </a:prstGeom>
+          <a:noFill/>
+          <a:ln w="9525">
+            <a:noFill/>
+            <a:headEnd/>
+            <a:tailEnd/>
+          </a:ln>
+        </p:spPr>
+      </p:pic>
+    </p:spTree>
+  </p:cSld>
+</p:sld>
+</file>
+
+<file path=ppt/slides/slide36.xml><?xml version="1.0" encoding="utf-8"?>
+<p:sld xmlns:a="http://schemas.openxmlformats.org/drawingml/2006/main" xmlns:r="http://schemas.openxmlformats.org/officeDocument/2006/relationships" xmlns:p="http://schemas.openxmlformats.org/presentationml/2006/main">
+  <p:cSld>
+    <p:spTree>
+      <p:nvGrpSpPr>
+        <p:cNvPr id="1" name=""/>
+        <p:cNvGrpSpPr/>
+        <p:nvPr/>
+      </p:nvGrpSpPr>
+      <p:grpSpPr>
+        <a:xfrm>
+          <a:off x="0" y="0"/>
+          <a:ext cx="0" cy="0"/>
+          <a:chOff x="0" y="0"/>
+          <a:chExt cx="0" cy="0"/>
+        </a:xfrm>
+      </p:grpSpPr>
+      <p:sp>
+        <p:nvSpPr>
+          <p:cNvPr id="2" name="Title 1"/>
+          <p:cNvSpPr>
+            <a:spLocks noGrp="1"/>
+          </p:cNvSpPr>
+          <p:nvPr>
+            <p:ph type="title"/>
+          </p:nvPr>
+        </p:nvSpPr>
+        <p:spPr/>
+        <p:txBody>
+          <a:bodyPr/>
+          <a:lstStyle/>
+          <a:p>
+            <a:pPr lvl="0" marL="0" indent="0">
+              <a:buNone/>
+            </a:pPr>
+            <a:r>
+              <a:rPr/>
+              <a:t>Cluster</a:t>
+            </a:r>
+            <a:r>
+              <a:rPr/>
+              <a:t> </a:t>
+            </a:r>
+            <a:r>
+              <a:rPr/>
+              <a:t>effect</a:t>
+            </a:r>
+          </a:p>
+        </p:txBody>
+      </p:sp>
+      <p:pic>
+        <p:nvPicPr>
+          <p:cNvPr descr="../images/rats_cluster_model.png" id="0" name="Picture 1"/>
+          <p:cNvPicPr>
+            <a:picLocks noGrp="1" noChangeAspect="1"/>
+          </p:cNvPicPr>
+          <p:nvPr/>
+        </p:nvPicPr>
+        <p:blipFill>
+          <a:blip r:embed="rId2"/>
+          <a:stretch>
+            <a:fillRect/>
+          </a:stretch>
+        </p:blipFill>
+        <p:spPr bwMode="auto">
+          <a:xfrm>
+            <a:off x="457200" y="2463800"/>
+            <a:ext cx="8229600" cy="2298700"/>
+          </a:xfrm>
+          <a:prstGeom prst="rect">
+            <a:avLst/>
+          </a:prstGeom>
+          <a:noFill/>
+          <a:ln w="9525">
+            <a:noFill/>
+            <a:headEnd/>
+            <a:tailEnd/>
+          </a:ln>
+        </p:spPr>
+      </p:pic>
+      <p:sp>
+        <p:nvSpPr>
+          <p:cNvPr id="1" name="TextBox 3"/>
+          <p:cNvSpPr txBox="1"/>
+          <p:nvPr/>
+        </p:nvSpPr>
+        <p:spPr>
+          <a:xfrm>
+            <a:off x="457200" y="5613400"/>
+            <a:ext cx="8229600" cy="508000"/>
+          </a:xfrm>
+          <a:prstGeom prst="rect">
+            <a:avLst/>
+          </a:prstGeom>
+          <a:noFill/>
+        </p:spPr>
+        <p:txBody>
+          <a:bodyPr/>
+          <a:lstStyle/>
+          <a:p>
+            <a:pPr lvl="0" marL="0" indent="0" algn="ctr">
+              <a:buNone/>
+            </a:pPr>
+            <a:r>
+              <a:rPr/>
+              <a:t>Cluster</a:t>
+            </a:r>
+            <a:r>
+              <a:rPr/>
+              <a:t> </a:t>
+            </a:r>
+            <a:r>
+              <a:rPr/>
+              <a:t>model</a:t>
+            </a:r>
+            <a:r>
+              <a:rPr/>
+              <a:t> </a:t>
+            </a:r>
+            <a:r>
+              <a:rPr/>
+              <a:t>for</a:t>
+            </a:r>
+            <a:r>
+              <a:rPr/>
+              <a:t> </a:t>
+            </a:r>
+            <a:r>
+              <a:rPr/>
+              <a:t>rats</a:t>
+            </a:r>
+            <a:r>
+              <a:rPr/>
+              <a:t> </a:t>
+            </a:r>
+            <a:r>
+              <a:rPr/>
+              <a:t>data</a:t>
+            </a:r>
+          </a:p>
+        </p:txBody>
+      </p:sp>
+    </p:spTree>
+  </p:cSld>
+</p:sld>
+</file>
+
+<file path=ppt/slides/slide37.xml><?xml version="1.0" encoding="utf-8"?>
+<p:sld xmlns:a="http://schemas.openxmlformats.org/drawingml/2006/main" xmlns:r="http://schemas.openxmlformats.org/officeDocument/2006/relationships" xmlns:p="http://schemas.openxmlformats.org/presentationml/2006/main">
+  <p:cSld>
+    <p:spTree>
+      <p:nvGrpSpPr>
+        <p:cNvPr id="1" name=""/>
+        <p:cNvGrpSpPr/>
+        <p:nvPr/>
+      </p:nvGrpSpPr>
+      <p:grpSpPr>
+        <a:xfrm>
+          <a:off x="0" y="0"/>
+          <a:ext cx="0" cy="0"/>
+          <a:chOff x="0" y="0"/>
+          <a:chExt cx="0" cy="0"/>
+        </a:xfrm>
+      </p:grpSpPr>
+      <p:sp>
+        <p:nvSpPr>
+          <p:cNvPr id="2" name="Title 1"/>
+          <p:cNvSpPr>
+            <a:spLocks noGrp="1"/>
+          </p:cNvSpPr>
+          <p:nvPr>
+            <p:ph type="title"/>
+          </p:nvPr>
+        </p:nvSpPr>
+        <p:spPr/>
+        <p:txBody>
+          <a:bodyPr/>
+          <a:lstStyle/>
+          <a:p>
+            <a:pPr lvl="0" marL="0" indent="0">
+              <a:buNone/>
+            </a:pPr>
+            <a:r>
+              <a:rPr/>
+              <a:t>Frailty</a:t>
+            </a:r>
+            <a:r>
+              <a:rPr/>
+              <a:t> </a:t>
+            </a:r>
+            <a:r>
+              <a:rPr/>
+              <a:t>effect</a:t>
+            </a:r>
+          </a:p>
+        </p:txBody>
+      </p:sp>
+      <p:pic>
+        <p:nvPicPr>
+          <p:cNvPr descr="../images/rats_frailty_model.png" id="0" name="Picture 1"/>
+          <p:cNvPicPr>
+            <a:picLocks noGrp="1" noChangeAspect="1"/>
+          </p:cNvPicPr>
+          <p:nvPr/>
+        </p:nvPicPr>
+        <p:blipFill>
+          <a:blip r:embed="rId2"/>
+          <a:stretch>
+            <a:fillRect/>
+          </a:stretch>
+        </p:blipFill>
+        <p:spPr bwMode="auto">
+          <a:xfrm>
+            <a:off x="457200" y="2057400"/>
+            <a:ext cx="8229600" cy="3111500"/>
+          </a:xfrm>
+          <a:prstGeom prst="rect">
+            <a:avLst/>
+          </a:prstGeom>
+          <a:noFill/>
+          <a:ln w="9525">
+            <a:noFill/>
+            <a:headEnd/>
+            <a:tailEnd/>
+          </a:ln>
+        </p:spPr>
+      </p:pic>
+      <p:sp>
+        <p:nvSpPr>
+          <p:cNvPr id="1" name="TextBox 3"/>
+          <p:cNvSpPr txBox="1"/>
+          <p:nvPr/>
+        </p:nvSpPr>
+        <p:spPr>
+          <a:xfrm>
+            <a:off x="457200" y="5613400"/>
+            <a:ext cx="8229600" cy="508000"/>
+          </a:xfrm>
+          <a:prstGeom prst="rect">
+            <a:avLst/>
+          </a:prstGeom>
+          <a:noFill/>
+        </p:spPr>
+        <p:txBody>
+          <a:bodyPr/>
+          <a:lstStyle/>
+          <a:p>
+            <a:pPr lvl="0" marL="0" indent="0" algn="ctr">
+              <a:buNone/>
+            </a:pPr>
+            <a:r>
+              <a:rPr/>
+              <a:t>Frailty</a:t>
+            </a:r>
+            <a:r>
+              <a:rPr/>
+              <a:t> </a:t>
+            </a:r>
+            <a:r>
+              <a:rPr/>
+              <a:t>model</a:t>
+            </a:r>
+            <a:r>
+              <a:rPr/>
+              <a:t> </a:t>
+            </a:r>
+            <a:r>
+              <a:rPr/>
+              <a:t>for</a:t>
+            </a:r>
+            <a:r>
+              <a:rPr/>
+              <a:t> </a:t>
+            </a:r>
+            <a:r>
+              <a:rPr/>
+              <a:t>rats</a:t>
+            </a:r>
+            <a:r>
+              <a:rPr/>
+              <a:t> </a:t>
+            </a:r>
+            <a:r>
+              <a:rPr/>
+              <a:t>data</a:t>
+            </a:r>
+          </a:p>
+        </p:txBody>
+      </p:sp>
+    </p:spTree>
+  </p:cSld>
+</p:sld>
+</file>
+
+<file path=ppt/slides/slide38.xml><?xml version="1.0" encoding="utf-8"?>
+<p:sld xmlns:a="http://schemas.openxmlformats.org/drawingml/2006/main" xmlns:r="http://schemas.openxmlformats.org/officeDocument/2006/relationships" xmlns:p="http://schemas.openxmlformats.org/presentationml/2006/main">
+  <p:cSld>
+    <p:spTree>
+      <p:nvGrpSpPr>
+        <p:cNvPr id="1" name=""/>
+        <p:cNvGrpSpPr/>
+        <p:nvPr/>
+      </p:nvGrpSpPr>
+      <p:grpSpPr>
+        <a:xfrm>
+          <a:off x="0" y="0"/>
+          <a:ext cx="0" cy="0"/>
+          <a:chOff x="0" y="0"/>
+          <a:chExt cx="0" cy="0"/>
+        </a:xfrm>
+      </p:grpSpPr>
+      <p:sp>
+        <p:nvSpPr>
+          <p:cNvPr id="2" name="Title 1"/>
+          <p:cNvSpPr>
+            <a:spLocks noGrp="1"/>
+          </p:cNvSpPr>
+          <p:nvPr>
+            <p:ph type="title"/>
+          </p:nvPr>
+        </p:nvSpPr>
+        <p:spPr/>
+        <p:txBody>
+          <a:bodyPr/>
+          <a:lstStyle/>
+          <a:p>
+            <a:pPr lvl="0" marL="0" indent="0">
+              <a:buNone/>
+            </a:pPr>
+            <a:r>
+              <a:rPr/>
+              <a:t>Three</a:t>
+            </a:r>
+            <a:r>
+              <a:rPr/>
+              <a:t> </a:t>
+            </a:r>
+            <a:r>
+              <a:rPr/>
+              <a:t>models</a:t>
+            </a:r>
+          </a:p>
+        </p:txBody>
+      </p:sp>
+      <p:sp>
+        <p:nvSpPr>
+          <p:cNvPr id="3" name="Content Placeholder 2"/>
+          <p:cNvSpPr>
+            <a:spLocks noGrp="1"/>
+          </p:cNvSpPr>
+          <p:nvPr>
+            <p:ph idx="1"/>
+          </p:nvPr>
+        </p:nvSpPr>
+        <p:spPr/>
+        <p:txBody>
+          <a:bodyPr/>
+          <a:lstStyle/>
+          <a:p>
+            <a:pPr lvl="0" marL="0" indent="0">
+              <a:buNone/>
+            </a:pPr>
+            <a:r>
+              <a:rPr/>
+              <a:t>When you have two or more events occurring on a single patient, you have three different options for analyzing the data. It all depends on what the clock restarts at after the first event.</a:t>
+            </a:r>
+          </a:p>
+        </p:txBody>
+      </p:sp>
+    </p:spTree>
+  </p:cSld>
+</p:sld>
+</file>
+
+<file path=ppt/slides/slide39.xml><?xml version="1.0" encoding="utf-8"?>
+<p:sld xmlns:a="http://schemas.openxmlformats.org/drawingml/2006/main" xmlns:r="http://schemas.openxmlformats.org/officeDocument/2006/relationships" xmlns:p="http://schemas.openxmlformats.org/presentationml/2006/main">
+  <p:cSld>
+    <p:spTree>
+      <p:nvGrpSpPr>
+        <p:cNvPr id="1" name=""/>
+        <p:cNvGrpSpPr/>
+        <p:nvPr/>
+      </p:nvGrpSpPr>
+      <p:grpSpPr>
+        <a:xfrm>
+          <a:off x="0" y="0"/>
+          <a:ext cx="0" cy="0"/>
+          <a:chOff x="0" y="0"/>
+          <a:chExt cx="0" cy="0"/>
+        </a:xfrm>
+      </p:grpSpPr>
+      <p:sp>
+        <p:nvSpPr>
+          <p:cNvPr id="2" name="Title 1"/>
+          <p:cNvSpPr>
+            <a:spLocks noGrp="1"/>
+          </p:cNvSpPr>
+          <p:nvPr>
+            <p:ph type="title"/>
+          </p:nvPr>
+        </p:nvSpPr>
+        <p:spPr/>
+        <p:txBody>
+          <a:bodyPr/>
+          <a:lstStyle/>
+          <a:p>
+            <a:pPr lvl="0" marL="0" indent="0">
+              <a:buNone/>
+            </a:pPr>
+            <a:r>
+              <a:rPr/>
+              <a:t>Graphical</a:t>
+            </a:r>
+            <a:r>
+              <a:rPr/>
+              <a:t> </a:t>
+            </a:r>
+            <a:r>
+              <a:rPr/>
+              <a:t>display</a:t>
+            </a:r>
+            <a:r>
+              <a:rPr/>
+              <a:t> </a:t>
+            </a:r>
+            <a:r>
+              <a:rPr/>
+              <a:t>of</a:t>
+            </a:r>
+            <a:r>
+              <a:rPr/>
+              <a:t> </a:t>
+            </a:r>
+            <a:r>
+              <a:rPr/>
+              <a:t>three</a:t>
+            </a:r>
+            <a:r>
+              <a:rPr/>
+              <a:t> </a:t>
+            </a:r>
+            <a:r>
+              <a:rPr/>
+              <a:t>models</a:t>
+            </a:r>
+          </a:p>
+        </p:txBody>
+      </p:sp>
+      <p:sp>
+        <p:nvSpPr>
+          <p:cNvPr id="3" name="Content Placeholder 2"/>
+          <p:cNvSpPr>
+            <a:spLocks noGrp="1"/>
+          </p:cNvSpPr>
+          <p:nvPr>
+            <p:ph idx="1"/>
+          </p:nvPr>
+        </p:nvSpPr>
+        <p:spPr/>
+        <p:txBody>
+          <a:bodyPr/>
+          <a:lstStyle/>
+          <a:p>
+            <a:pPr lvl="0" marL="0" indent="0">
+              <a:buNone/>
+            </a:pPr>
+            <a:r>
+              <a:rPr/>
+              <a:t>Save everything for possible later re-use.</a:t>
             </a:r>
           </a:p>
         </p:txBody>

</xml_diff>

<commit_message>
Added multiple events graph.
</commit_message>
<xml_diff>
--- a/r/class7.pptx
+++ b/r/class7.pptx
@@ -44,6 +44,9 @@
     <p:sldId id="292" r:id="rId38"/>
     <p:sldId id="293" r:id="rId39"/>
     <p:sldId id="294" r:id="rId40"/>
+    <p:sldId id="295" r:id="rId41"/>
+    <p:sldId id="296" r:id="rId42"/>
+    <p:sldId id="297" r:id="rId43"/>
   </p:sldIdLst>
   <p:sldSz cx="9144000" cy="6858000" type="screen4x3"/>
   <p:notesSz cx="6858000" cy="9144000"/>
@@ -6313,7 +6316,7 @@
       </p:sp>
       <p:pic>
         <p:nvPicPr>
-          <p:cNvPr descr="class7_files/figure-pptx/graph-gamma-1.png" id="0" name="Picture 1"/>
+          <p:cNvPr descr="class7_files/figure-pptx/graph-gamma-10-1.png" id="0" name="Picture 1"/>
           <p:cNvPicPr>
             <a:picLocks noGrp="1" noChangeAspect="1"/>
           </p:cNvPicPr>
@@ -7589,27 +7592,102 @@
           </a:p>
         </p:txBody>
       </p:sp>
-      <p:sp>
-        <p:nvSpPr>
-          <p:cNvPr id="3" name="Content Placeholder 2"/>
-          <p:cNvSpPr>
-            <a:spLocks noGrp="1"/>
-          </p:cNvSpPr>
-          <p:nvPr>
-            <p:ph idx="1"/>
-          </p:nvPr>
-        </p:nvSpPr>
-        <p:spPr/>
-        <p:txBody>
-          <a:bodyPr/>
-          <a:lstStyle/>
-          <a:p>
-            <a:pPr lvl="0" marL="0" indent="0">
+      <p:pic>
+        <p:nvPicPr>
+          <p:cNvPr descr="../images/multiple_events_graph.png" id="0" name="Picture 1"/>
+          <p:cNvPicPr>
+            <a:picLocks noGrp="1" noChangeAspect="1"/>
+          </p:cNvPicPr>
+          <p:nvPr/>
+        </p:nvPicPr>
+        <p:blipFill>
+          <a:blip r:embed="rId2"/>
+          <a:stretch>
+            <a:fillRect/>
+          </a:stretch>
+        </p:blipFill>
+        <p:spPr bwMode="auto">
+          <a:xfrm>
+            <a:off x="1346200" y="1600200"/>
+            <a:ext cx="6451600" cy="4013200"/>
+          </a:xfrm>
+          <a:prstGeom prst="rect">
+            <a:avLst/>
+          </a:prstGeom>
+          <a:noFill/>
+          <a:ln w="9525">
+            <a:noFill/>
+            <a:headEnd/>
+            <a:tailEnd/>
+          </a:ln>
+        </p:spPr>
+      </p:pic>
+      <p:sp>
+        <p:nvSpPr>
+          <p:cNvPr id="1" name="TextBox 3"/>
+          <p:cNvSpPr txBox="1"/>
+          <p:nvPr/>
+        </p:nvSpPr>
+        <p:spPr>
+          <a:xfrm>
+            <a:off x="457200" y="5613400"/>
+            <a:ext cx="8229600" cy="508000"/>
+          </a:xfrm>
+          <a:prstGeom prst="rect">
+            <a:avLst/>
+          </a:prstGeom>
+          <a:noFill/>
+        </p:spPr>
+        <p:txBody>
+          <a:bodyPr/>
+          <a:lstStyle/>
+          <a:p>
+            <a:pPr lvl="0" marL="0" indent="0" algn="ctr">
               <a:buNone/>
             </a:pPr>
             <a:r>
               <a:rPr/>
-              <a:t>Save everything for possible later re-use.</a:t>
+              <a:t>Different</a:t>
+            </a:r>
+            <a:r>
+              <a:rPr/>
+              <a:t> </a:t>
+            </a:r>
+            <a:r>
+              <a:rPr/>
+              <a:t>models</a:t>
+            </a:r>
+            <a:r>
+              <a:rPr/>
+              <a:t> </a:t>
+            </a:r>
+            <a:r>
+              <a:rPr/>
+              <a:t>for</a:t>
+            </a:r>
+            <a:r>
+              <a:rPr/>
+              <a:t> </a:t>
+            </a:r>
+            <a:r>
+              <a:rPr/>
+              <a:t>timing</a:t>
+            </a:r>
+            <a:r>
+              <a:rPr/>
+              <a:t> </a:t>
+            </a:r>
+            <a:r>
+              <a:rPr/>
+              <a:t>multiple</a:t>
+            </a:r>
+            <a:r>
+              <a:rPr/>
+              <a:t> </a:t>
+            </a:r>
+            <a:r>
+              <a:rPr/>
+              <a:t>events</a:t>
             </a:r>
           </a:p>
         </p:txBody>
@@ -7725,6 +7803,301 @@
               <a:t>## The following object is masked from 'package:base':
 ## 
 ##     backsolve</a:t>
+            </a:r>
+          </a:p>
+        </p:txBody>
+      </p:sp>
+    </p:spTree>
+  </p:cSld>
+</p:sld>
+</file>
+
+<file path=ppt/slides/slide40.xml><?xml version="1.0" encoding="utf-8"?>
+<p:sld xmlns:a="http://schemas.openxmlformats.org/drawingml/2006/main" xmlns:r="http://schemas.openxmlformats.org/officeDocument/2006/relationships" xmlns:p="http://schemas.openxmlformats.org/presentationml/2006/main">
+  <p:cSld>
+    <p:spTree>
+      <p:nvGrpSpPr>
+        <p:cNvPr id="1" name=""/>
+        <p:cNvGrpSpPr/>
+        <p:nvPr/>
+      </p:nvGrpSpPr>
+      <p:grpSpPr>
+        <a:xfrm>
+          <a:off x="0" y="0"/>
+          <a:ext cx="0" cy="0"/>
+          <a:chOff x="0" y="0"/>
+          <a:chExt cx="0" cy="0"/>
+        </a:xfrm>
+      </p:grpSpPr>
+      <p:sp>
+        <p:nvSpPr>
+          <p:cNvPr id="2" name="Title 1"/>
+          <p:cNvSpPr>
+            <a:spLocks noGrp="1"/>
+          </p:cNvSpPr>
+          <p:nvPr>
+            <p:ph type="title"/>
+          </p:nvPr>
+        </p:nvSpPr>
+        <p:spPr/>
+        <p:txBody>
+          <a:bodyPr/>
+          <a:lstStyle/>
+          <a:p>
+            <a:pPr lvl="0" marL="0" indent="0">
+              <a:buNone/>
+            </a:pPr>
+            <a:r>
+              <a:rPr/>
+              <a:t>What</a:t>
+            </a:r>
+            <a:r>
+              <a:rPr/>
+              <a:t> </a:t>
+            </a:r>
+            <a:r>
+              <a:rPr/>
+              <a:t>have</a:t>
+            </a:r>
+            <a:r>
+              <a:rPr/>
+              <a:t> </a:t>
+            </a:r>
+            <a:r>
+              <a:rPr/>
+              <a:t>you</a:t>
+            </a:r>
+            <a:r>
+              <a:rPr/>
+              <a:t> </a:t>
+            </a:r>
+            <a:r>
+              <a:rPr/>
+              <a:t>learned</a:t>
+            </a:r>
+            <a:r>
+              <a:rPr/>
+              <a:t> </a:t>
+            </a:r>
+            <a:r>
+              <a:rPr/>
+              <a:t>today</a:t>
+            </a:r>
+          </a:p>
+        </p:txBody>
+      </p:sp>
+      <p:sp>
+        <p:nvSpPr>
+          <p:cNvPr id="3" name="Content Placeholder 2"/>
+          <p:cNvSpPr>
+            <a:spLocks noGrp="1"/>
+          </p:cNvSpPr>
+          <p:nvPr>
+            <p:ph idx="1"/>
+          </p:nvPr>
+        </p:nvSpPr>
+        <p:spPr/>
+        <p:txBody>
+          <a:bodyPr/>
+          <a:lstStyle/>
+          <a:p>
+            <a:pPr lvl="1"/>
+            <a:r>
+              <a:rPr/>
+              <a:t>Left censoring versus left truncation</a:t>
+            </a:r>
+          </a:p>
+          <a:p>
+            <a:pPr lvl="1"/>
+            <a:r>
+              <a:rPr/>
+              <a:t>Interval censoring</a:t>
+            </a:r>
+          </a:p>
+          <a:p>
+            <a:pPr lvl="1"/>
+            <a:r>
+              <a:rPr/>
+              <a:t>Cluster models</a:t>
+            </a:r>
+          </a:p>
+          <a:p>
+            <a:pPr lvl="1"/>
+            <a:r>
+              <a:rPr/>
+              <a:t>Frailty models</a:t>
+            </a:r>
+          </a:p>
+        </p:txBody>
+      </p:sp>
+    </p:spTree>
+  </p:cSld>
+</p:sld>
+</file>
+
+<file path=ppt/slides/slide41.xml><?xml version="1.0" encoding="utf-8"?>
+<p:sld xmlns:a="http://schemas.openxmlformats.org/drawingml/2006/main" xmlns:r="http://schemas.openxmlformats.org/officeDocument/2006/relationships" xmlns:p="http://schemas.openxmlformats.org/presentationml/2006/main">
+  <p:cSld>
+    <p:spTree>
+      <p:nvGrpSpPr>
+        <p:cNvPr id="1" name=""/>
+        <p:cNvGrpSpPr/>
+        <p:nvPr/>
+      </p:nvGrpSpPr>
+      <p:grpSpPr>
+        <a:xfrm>
+          <a:off x="0" y="0"/>
+          <a:ext cx="0" cy="0"/>
+          <a:chOff x="0" y="0"/>
+          <a:chExt cx="0" cy="0"/>
+        </a:xfrm>
+      </p:grpSpPr>
+      <p:sp>
+        <p:nvSpPr>
+          <p:cNvPr id="2" name="Title 1"/>
+          <p:cNvSpPr>
+            <a:spLocks noGrp="1"/>
+          </p:cNvSpPr>
+          <p:nvPr>
+            <p:ph type="title"/>
+          </p:nvPr>
+        </p:nvSpPr>
+        <p:spPr/>
+        <p:txBody>
+          <a:bodyPr/>
+          <a:lstStyle/>
+          <a:p>
+            <a:pPr lvl="0" marL="0" indent="0">
+              <a:buNone/>
+            </a:pPr>
+            <a:r>
+              <a:rPr/>
+              <a:t>Your</a:t>
+            </a:r>
+            <a:r>
+              <a:rPr/>
+              <a:t> </a:t>
+            </a:r>
+            <a:r>
+              <a:rPr/>
+              <a:t>homework</a:t>
+            </a:r>
+          </a:p>
+        </p:txBody>
+      </p:sp>
+      <p:sp>
+        <p:nvSpPr>
+          <p:cNvPr id="3" name="Content Placeholder 2"/>
+          <p:cNvSpPr>
+            <a:spLocks noGrp="1"/>
+          </p:cNvSpPr>
+          <p:nvPr>
+            <p:ph idx="1"/>
+          </p:nvPr>
+        </p:nvSpPr>
+        <p:spPr/>
+        <p:txBody>
+          <a:bodyPr/>
+          <a:lstStyle/>
+          <a:p>
+            <a:pPr lvl="1">
+              <a:buAutoNum type="arabicPeriod"/>
+            </a:pPr>
+            <a:r>
+              <a:rPr/>
+              <a:t>Open the file, diabetes.csv.</a:t>
+            </a:r>
+          </a:p>
+          <a:p>
+            <a:pPr lvl="1"/>
+            <a:r>
+              <a:rPr/>
+              <a:t>Calculate and graph a Kaplan-Meier curve comparing treated to untreated eyes, ignoring for now the correlations inherent in this data set. Does it appear as if these survival curves differ? If so, do they appear to violate the assumption of proportional hazards?</a:t>
+            </a:r>
+          </a:p>
+        </p:txBody>
+      </p:sp>
+    </p:spTree>
+  </p:cSld>
+</p:sld>
+</file>
+
+<file path=ppt/slides/slide42.xml><?xml version="1.0" encoding="utf-8"?>
+<p:sld xmlns:a="http://schemas.openxmlformats.org/drawingml/2006/main" xmlns:r="http://schemas.openxmlformats.org/officeDocument/2006/relationships" xmlns:p="http://schemas.openxmlformats.org/presentationml/2006/main">
+  <p:cSld>
+    <p:spTree>
+      <p:nvGrpSpPr>
+        <p:cNvPr id="1" name=""/>
+        <p:cNvGrpSpPr/>
+        <p:nvPr/>
+      </p:nvGrpSpPr>
+      <p:grpSpPr>
+        <a:xfrm>
+          <a:off x="0" y="0"/>
+          <a:ext cx="0" cy="0"/>
+          <a:chOff x="0" y="0"/>
+          <a:chExt cx="0" cy="0"/>
+        </a:xfrm>
+      </p:grpSpPr>
+      <p:sp>
+        <p:nvSpPr>
+          <p:cNvPr id="2" name="Title 1"/>
+          <p:cNvSpPr>
+            <a:spLocks noGrp="1"/>
+          </p:cNvSpPr>
+          <p:nvPr>
+            <p:ph type="title"/>
+          </p:nvPr>
+        </p:nvSpPr>
+        <p:spPr/>
+        <p:txBody>
+          <a:bodyPr/>
+          <a:lstStyle/>
+          <a:p>
+            <a:pPr lvl="0" marL="0" indent="0">
+              <a:buNone/>
+            </a:pPr>
+            <a:r>
+              <a:rPr/>
+              <a:t>Your</a:t>
+            </a:r>
+            <a:r>
+              <a:rPr/>
+              <a:t> </a:t>
+            </a:r>
+            <a:r>
+              <a:rPr/>
+              <a:t>homework</a:t>
+            </a:r>
+          </a:p>
+        </p:txBody>
+      </p:sp>
+      <p:sp>
+        <p:nvSpPr>
+          <p:cNvPr id="3" name="Content Placeholder 2"/>
+          <p:cNvSpPr>
+            <a:spLocks noGrp="1"/>
+          </p:cNvSpPr>
+          <p:nvPr>
+            <p:ph idx="1"/>
+          </p:nvPr>
+        </p:nvSpPr>
+        <p:spPr/>
+        <p:txBody>
+          <a:bodyPr/>
+          <a:lstStyle/>
+          <a:p>
+            <a:pPr lvl="1"/>
+            <a:r>
+              <a:rPr/>
+              <a:t>Calculate and interpret a Cox regression model using treat as an independent variable and id as a cluster effect.</a:t>
+            </a:r>
+          </a:p>
+          <a:p>
+            <a:pPr lvl="1"/>
+            <a:r>
+              <a:rPr/>
+              <a:t>Calculate and interpret a Cox regression model using treat as an independent variable and id as a frailty effect.</a:t>
             </a:r>
           </a:p>
         </p:txBody>

</xml_diff>